<commit_message>
Added pictures to the slides
</commit_message>
<xml_diff>
--- a/CS325 Final Presentation Outline.pptx
+++ b/CS325 Final Presentation Outline.pptx
@@ -7,12 +7,13 @@
   <p:sldIdLst>
     <p:sldId id="256" r:id="rId2"/>
     <p:sldId id="258" r:id="rId3"/>
-    <p:sldId id="263" r:id="rId4"/>
-    <p:sldId id="259" r:id="rId5"/>
-    <p:sldId id="260" r:id="rId6"/>
-    <p:sldId id="262" r:id="rId7"/>
-    <p:sldId id="261" r:id="rId8"/>
-    <p:sldId id="257" r:id="rId9"/>
+    <p:sldId id="264" r:id="rId4"/>
+    <p:sldId id="263" r:id="rId5"/>
+    <p:sldId id="259" r:id="rId6"/>
+    <p:sldId id="260" r:id="rId7"/>
+    <p:sldId id="262" r:id="rId8"/>
+    <p:sldId id="261" r:id="rId9"/>
+    <p:sldId id="257" r:id="rId10"/>
   </p:sldIdLst>
   <p:sldSz cx="9144000" cy="6858000" type="screen4x3"/>
   <p:notesSz cx="6858000" cy="9144000"/>
@@ -3343,7 +3344,7 @@
     </p:spTree>
     <p:extLst>
       <p:ext uri="{BB962C8B-B14F-4D97-AF65-F5344CB8AC3E}">
-        <p14:creationId xmlns:p14="http://schemas.microsoft.com/office/powerpoint/2010/main" xmlns="" val="2096083604"/>
+        <p14:creationId xmlns="" xmlns:p14="http://schemas.microsoft.com/office/powerpoint/2010/main" val="2096083604"/>
       </p:ext>
     </p:extLst>
   </p:cSld>
@@ -3392,18 +3393,6 @@
           <a:bodyPr/>
           <a:lstStyle/>
           <a:p>
-            <a:r>
-              <a:rPr lang="en-US" dirty="0" smtClean="0"/>
-              <a:t>(add </a:t>
-            </a:r>
-            <a:r>
-              <a:rPr lang="en-US" dirty="0" err="1" smtClean="0"/>
-              <a:t>pictues</a:t>
-            </a:r>
-            <a:r>
-              <a:rPr lang="en-US" dirty="0" smtClean="0"/>
-              <a:t>)</a:t>
-            </a:r>
             <a:endParaRPr lang="en-US" dirty="0"/>
           </a:p>
         </p:txBody>
@@ -3431,10 +3420,62 @@
           </a:p>
         </p:txBody>
       </p:sp>
+      <p:pic>
+        <p:nvPicPr>
+          <p:cNvPr id="2050" name="Picture 2" descr="C:\Users\Jsmilex\Desktop\a1.png"/>
+          <p:cNvPicPr>
+            <a:picLocks noChangeAspect="1" noChangeArrowheads="1"/>
+          </p:cNvPicPr>
+          <p:nvPr/>
+        </p:nvPicPr>
+        <p:blipFill>
+          <a:blip r:embed="rId2"/>
+          <a:srcRect/>
+          <a:stretch>
+            <a:fillRect/>
+          </a:stretch>
+        </p:blipFill>
+        <p:spPr bwMode="auto">
+          <a:xfrm>
+            <a:off x="1219200" y="2819400"/>
+            <a:ext cx="2540000" cy="2540000"/>
+          </a:xfrm>
+          <a:prstGeom prst="rect">
+            <a:avLst/>
+          </a:prstGeom>
+          <a:noFill/>
+        </p:spPr>
+      </p:pic>
+      <p:pic>
+        <p:nvPicPr>
+          <p:cNvPr id="2051" name="Picture 3" descr="C:\Users\Jsmilex\Desktop\a2.png"/>
+          <p:cNvPicPr>
+            <a:picLocks noChangeAspect="1" noChangeArrowheads="1"/>
+          </p:cNvPicPr>
+          <p:nvPr/>
+        </p:nvPicPr>
+        <p:blipFill>
+          <a:blip r:embed="rId3"/>
+          <a:srcRect/>
+          <a:stretch>
+            <a:fillRect/>
+          </a:stretch>
+        </p:blipFill>
+        <p:spPr bwMode="auto">
+          <a:xfrm>
+            <a:off x="5181600" y="2895600"/>
+            <a:ext cx="2540000" cy="2540000"/>
+          </a:xfrm>
+          <a:prstGeom prst="rect">
+            <a:avLst/>
+          </a:prstGeom>
+          <a:noFill/>
+        </p:spPr>
+      </p:pic>
     </p:spTree>
     <p:extLst>
       <p:ext uri="{BB962C8B-B14F-4D97-AF65-F5344CB8AC3E}">
-        <p14:creationId xmlns:p14="http://schemas.microsoft.com/office/powerpoint/2010/main" xmlns="" val="2567901457"/>
+        <p14:creationId xmlns="" xmlns:p14="http://schemas.microsoft.com/office/powerpoint/2010/main" val="2567901457"/>
       </p:ext>
     </p:extLst>
   </p:cSld>
@@ -3452,6 +3493,129 @@
 </file>
 
 <file path=ppt/slides/slide3.xml><?xml version="1.0" encoding="utf-8"?>
+<p:sld xmlns:a="http://schemas.openxmlformats.org/drawingml/2006/main" xmlns:r="http://schemas.openxmlformats.org/officeDocument/2006/relationships" xmlns:p="http://schemas.openxmlformats.org/presentationml/2006/main">
+  <p:cSld>
+    <p:spTree>
+      <p:nvGrpSpPr>
+        <p:cNvPr id="1" name=""/>
+        <p:cNvGrpSpPr/>
+        <p:nvPr/>
+      </p:nvGrpSpPr>
+      <p:grpSpPr>
+        <a:xfrm>
+          <a:off x="0" y="0"/>
+          <a:ext cx="0" cy="0"/>
+          <a:chOff x="0" y="0"/>
+          <a:chExt cx="0" cy="0"/>
+        </a:xfrm>
+      </p:grpSpPr>
+      <p:sp>
+        <p:nvSpPr>
+          <p:cNvPr id="2" name="Content Placeholder 1"/>
+          <p:cNvSpPr>
+            <a:spLocks noGrp="1"/>
+          </p:cNvSpPr>
+          <p:nvPr>
+            <p:ph idx="1"/>
+          </p:nvPr>
+        </p:nvSpPr>
+        <p:spPr/>
+        <p:txBody>
+          <a:bodyPr/>
+          <a:lstStyle/>
+          <a:p>
+            <a:r>
+              <a:rPr lang="en-US" dirty="0" smtClean="0"/>
+              <a:t>Levels designed to teach the player how to play the game</a:t>
+            </a:r>
+            <a:endParaRPr lang="en-US" dirty="0"/>
+          </a:p>
+        </p:txBody>
+      </p:sp>
+      <p:sp>
+        <p:nvSpPr>
+          <p:cNvPr id="3" name="Title 2"/>
+          <p:cNvSpPr>
+            <a:spLocks noGrp="1"/>
+          </p:cNvSpPr>
+          <p:nvPr>
+            <p:ph type="title"/>
+          </p:nvPr>
+        </p:nvSpPr>
+        <p:spPr/>
+        <p:txBody>
+          <a:bodyPr/>
+          <a:lstStyle/>
+          <a:p>
+            <a:r>
+              <a:rPr smtClean="0"/>
+              <a:t>Levels that Teach</a:t>
+            </a:r>
+            <a:endParaRPr lang="en-US" dirty="0"/>
+          </a:p>
+        </p:txBody>
+      </p:sp>
+      <p:pic>
+        <p:nvPicPr>
+          <p:cNvPr id="1026" name="Picture 2" descr="C:\Users\Jsmilex\Desktop\Grow\levels\12_Free_As_A_Bird.png"/>
+          <p:cNvPicPr>
+            <a:picLocks noChangeAspect="1" noChangeArrowheads="1"/>
+          </p:cNvPicPr>
+          <p:nvPr/>
+        </p:nvPicPr>
+        <p:blipFill>
+          <a:blip r:embed="rId2"/>
+          <a:srcRect/>
+          <a:stretch>
+            <a:fillRect/>
+          </a:stretch>
+        </p:blipFill>
+        <p:spPr bwMode="auto">
+          <a:xfrm>
+            <a:off x="1219200" y="2819400"/>
+            <a:ext cx="2671762" cy="2671762"/>
+          </a:xfrm>
+          <a:prstGeom prst="rect">
+            <a:avLst/>
+          </a:prstGeom>
+          <a:noFill/>
+        </p:spPr>
+      </p:pic>
+      <p:pic>
+        <p:nvPicPr>
+          <p:cNvPr id="1027" name="Picture 3" descr="C:\Users\Jsmilex\Desktop\Grow\levels\02_Thrown_for_a_Loop.png"/>
+          <p:cNvPicPr>
+            <a:picLocks noChangeAspect="1" noChangeArrowheads="1"/>
+          </p:cNvPicPr>
+          <p:nvPr/>
+        </p:nvPicPr>
+        <p:blipFill>
+          <a:blip r:embed="rId3"/>
+          <a:srcRect/>
+          <a:stretch>
+            <a:fillRect/>
+          </a:stretch>
+        </p:blipFill>
+        <p:spPr bwMode="auto">
+          <a:xfrm>
+            <a:off x="5257800" y="2819400"/>
+            <a:ext cx="2671762" cy="2671762"/>
+          </a:xfrm>
+          <a:prstGeom prst="rect">
+            <a:avLst/>
+          </a:prstGeom>
+          <a:noFill/>
+        </p:spPr>
+      </p:pic>
+    </p:spTree>
+  </p:cSld>
+  <p:clrMapOvr>
+    <a:masterClrMapping/>
+  </p:clrMapOvr>
+</p:sld>
+</file>
+
+<file path=ppt/slides/slide4.xml><?xml version="1.0" encoding="utf-8"?>
 <p:sld xmlns:a="http://schemas.openxmlformats.org/drawingml/2006/main" xmlns:r="http://schemas.openxmlformats.org/officeDocument/2006/relationships" xmlns:p="http://schemas.openxmlformats.org/presentationml/2006/main">
   <p:cSld>
     <p:spTree>
@@ -3785,91 +3949,6 @@
 </p:sld>
 </file>
 
-<file path=ppt/slides/slide4.xml><?xml version="1.0" encoding="utf-8"?>
-<p:sld xmlns:a="http://schemas.openxmlformats.org/drawingml/2006/main" xmlns:r="http://schemas.openxmlformats.org/officeDocument/2006/relationships" xmlns:p="http://schemas.openxmlformats.org/presentationml/2006/main">
-  <p:cSld>
-    <p:spTree>
-      <p:nvGrpSpPr>
-        <p:cNvPr id="1" name=""/>
-        <p:cNvGrpSpPr/>
-        <p:nvPr/>
-      </p:nvGrpSpPr>
-      <p:grpSpPr>
-        <a:xfrm>
-          <a:off x="0" y="0"/>
-          <a:ext cx="0" cy="0"/>
-          <a:chOff x="0" y="0"/>
-          <a:chExt cx="0" cy="0"/>
-        </a:xfrm>
-      </p:grpSpPr>
-      <p:sp>
-        <p:nvSpPr>
-          <p:cNvPr id="4" name="Title 3"/>
-          <p:cNvSpPr>
-            <a:spLocks noGrp="1"/>
-          </p:cNvSpPr>
-          <p:nvPr>
-            <p:ph type="title"/>
-          </p:nvPr>
-        </p:nvSpPr>
-        <p:spPr/>
-        <p:txBody>
-          <a:bodyPr/>
-          <a:lstStyle/>
-          <a:p>
-            <a:r>
-              <a:rPr lang="en-US" dirty="0" smtClean="0"/>
-              <a:t>Live Demo</a:t>
-            </a:r>
-            <a:endParaRPr lang="en-US" dirty="0"/>
-          </a:p>
-        </p:txBody>
-      </p:sp>
-      <p:sp>
-        <p:nvSpPr>
-          <p:cNvPr id="5" name="Text Placeholder 4"/>
-          <p:cNvSpPr>
-            <a:spLocks noGrp="1"/>
-          </p:cNvSpPr>
-          <p:nvPr>
-            <p:ph type="body" idx="1"/>
-          </p:nvPr>
-        </p:nvSpPr>
-        <p:spPr/>
-        <p:txBody>
-          <a:bodyPr/>
-          <a:lstStyle/>
-          <a:p>
-            <a:r>
-              <a:rPr lang="en-US" dirty="0" smtClean="0">
-                <a:hlinkClick r:id="rId2" action="ppaction://hlinkfile"/>
-              </a:rPr>
-              <a:t>Run Game</a:t>
-            </a:r>
-            <a:endParaRPr lang="en-US" dirty="0"/>
-          </a:p>
-        </p:txBody>
-      </p:sp>
-    </p:spTree>
-    <p:extLst>
-      <p:ext uri="{BB962C8B-B14F-4D97-AF65-F5344CB8AC3E}">
-        <p14:creationId xmlns:p14="http://schemas.microsoft.com/office/powerpoint/2010/main" xmlns="" val="607344236"/>
-      </p:ext>
-    </p:extLst>
-  </p:cSld>
-  <p:clrMapOvr>
-    <a:masterClrMapping/>
-  </p:clrMapOvr>
-  <p:timing>
-    <p:tnLst>
-      <p:par>
-        <p:cTn id="1" dur="indefinite" restart="never" nodeType="tmRoot"/>
-      </p:par>
-    </p:tnLst>
-  </p:timing>
-</p:sld>
-</file>
-
 <file path=ppt/slides/slide5.xml><?xml version="1.0" encoding="utf-8"?>
 <p:sld xmlns:a="http://schemas.openxmlformats.org/drawingml/2006/main" xmlns:r="http://schemas.openxmlformats.org/officeDocument/2006/relationships" xmlns:p="http://schemas.openxmlformats.org/presentationml/2006/main">
   <p:cSld>
@@ -3889,12 +3968,12 @@
       </p:grpSpPr>
       <p:sp>
         <p:nvSpPr>
-          <p:cNvPr id="5" name="Content Placeholder 4"/>
-          <p:cNvSpPr>
-            <a:spLocks noGrp="1"/>
-          </p:cNvSpPr>
-          <p:nvPr>
-            <p:ph idx="1"/>
+          <p:cNvPr id="4" name="Title 3"/>
+          <p:cNvSpPr>
+            <a:spLocks noGrp="1"/>
+          </p:cNvSpPr>
+          <p:nvPr>
+            <p:ph type="title"/>
           </p:nvPr>
         </p:nvSpPr>
         <p:spPr/>
@@ -3904,7 +3983,7 @@
           <a:p>
             <a:r>
               <a:rPr lang="en-US" dirty="0" smtClean="0"/>
-              <a:t>Sounds</a:t>
+              <a:t>Live Demo</a:t>
             </a:r>
             <a:endParaRPr lang="en-US" dirty="0"/>
           </a:p>
@@ -3912,22 +3991,24 @@
       </p:sp>
       <p:sp>
         <p:nvSpPr>
-          <p:cNvPr id="4" name="Title 3"/>
-          <p:cNvSpPr>
-            <a:spLocks noGrp="1"/>
-          </p:cNvSpPr>
-          <p:nvPr>
-            <p:ph type="title"/>
-          </p:nvPr>
-        </p:nvSpPr>
-        <p:spPr/>
-        <p:txBody>
-          <a:bodyPr/>
-          <a:lstStyle/>
-          <a:p>
-            <a:r>
-              <a:rPr lang="en-US" dirty="0" smtClean="0"/>
-              <a:t>Biggest Challenge</a:t>
+          <p:cNvPr id="5" name="Text Placeholder 4"/>
+          <p:cNvSpPr>
+            <a:spLocks noGrp="1"/>
+          </p:cNvSpPr>
+          <p:nvPr>
+            <p:ph type="body" idx="1"/>
+          </p:nvPr>
+        </p:nvSpPr>
+        <p:spPr/>
+        <p:txBody>
+          <a:bodyPr/>
+          <a:lstStyle/>
+          <a:p>
+            <a:r>
+              <a:rPr lang="en-US" dirty="0" smtClean="0">
+                <a:hlinkClick r:id="rId2" action="ppaction://hlinkfile"/>
+              </a:rPr>
+              <a:t>Run Game</a:t>
             </a:r>
             <a:endParaRPr lang="en-US" dirty="0"/>
           </a:p>
@@ -3936,7 +4017,7 @@
     </p:spTree>
     <p:extLst>
       <p:ext uri="{BB962C8B-B14F-4D97-AF65-F5344CB8AC3E}">
-        <p14:creationId xmlns:p14="http://schemas.microsoft.com/office/powerpoint/2010/main" xmlns="" val="3656566094"/>
+        <p14:creationId xmlns="" xmlns:p14="http://schemas.microsoft.com/office/powerpoint/2010/main" val="607344236"/>
       </p:ext>
     </p:extLst>
   </p:cSld>
@@ -3972,7 +4053,7 @@
       </p:grpSpPr>
       <p:sp>
         <p:nvSpPr>
-          <p:cNvPr id="3" name="Content Placeholder 2"/>
+          <p:cNvPr id="5" name="Content Placeholder 4"/>
           <p:cNvSpPr>
             <a:spLocks noGrp="1"/>
           </p:cNvSpPr>
@@ -3986,23 +4067,16 @@
           <a:lstStyle/>
           <a:p>
             <a:r>
-              <a:rPr lang="en-US" dirty="0" err="1" smtClean="0"/>
-              <a:t>GitHub</a:t>
-            </a:r>
-            <a:r>
               <a:rPr lang="en-US" dirty="0" smtClean="0"/>
-              <a:t> is necessary</a:t>
-            </a:r>
-            <a:endParaRPr lang="en-US" dirty="0" smtClean="0"/>
-          </a:p>
-          <a:p>
+              <a:t>Sounds</a:t>
+            </a:r>
             <a:endParaRPr lang="en-US" dirty="0"/>
           </a:p>
         </p:txBody>
       </p:sp>
       <p:sp>
         <p:nvSpPr>
-          <p:cNvPr id="2" name="Title 1"/>
+          <p:cNvPr id="4" name="Title 3"/>
           <p:cNvSpPr>
             <a:spLocks noGrp="1"/>
           </p:cNvSpPr>
@@ -4017,7 +4091,7 @@
           <a:p>
             <a:r>
               <a:rPr lang="en-US" dirty="0" smtClean="0"/>
-              <a:t>Lessons Learned</a:t>
+              <a:t>Biggest Challenge</a:t>
             </a:r>
             <a:endParaRPr lang="en-US" dirty="0"/>
           </a:p>
@@ -4026,7 +4100,7 @@
     </p:spTree>
     <p:extLst>
       <p:ext uri="{BB962C8B-B14F-4D97-AF65-F5344CB8AC3E}">
-        <p14:creationId xmlns:p14="http://schemas.microsoft.com/office/powerpoint/2010/main" xmlns="" val="1622542430"/>
+        <p14:creationId xmlns="" xmlns:p14="http://schemas.microsoft.com/office/powerpoint/2010/main" val="3656566094"/>
       </p:ext>
     </p:extLst>
   </p:cSld>
@@ -4076,46 +4150,37 @@
           <a:lstStyle/>
           <a:p>
             <a:r>
+              <a:rPr lang="en-US" dirty="0" err="1" smtClean="0"/>
+              <a:t>GitHub</a:t>
+            </a:r>
+            <a:r>
               <a:rPr lang="en-US" dirty="0" smtClean="0"/>
-              <a:t>More Maps</a:t>
-            </a:r>
-          </a:p>
+              <a:t> is necessary</a:t>
+            </a:r>
+          </a:p>
+          <a:p>
+            <a:endParaRPr lang="en-US" dirty="0"/>
+          </a:p>
+        </p:txBody>
+      </p:sp>
+      <p:sp>
+        <p:nvSpPr>
+          <p:cNvPr id="2" name="Title 1"/>
+          <p:cNvSpPr>
+            <a:spLocks noGrp="1"/>
+          </p:cNvSpPr>
+          <p:nvPr>
+            <p:ph type="title"/>
+          </p:nvPr>
+        </p:nvSpPr>
+        <p:spPr/>
+        <p:txBody>
+          <a:bodyPr/>
+          <a:lstStyle/>
           <a:p>
             <a:r>
               <a:rPr lang="en-US" dirty="0" smtClean="0"/>
-              <a:t>More blocks </a:t>
-            </a:r>
-            <a:endParaRPr lang="en-US" dirty="0" smtClean="0"/>
-          </a:p>
-          <a:p>
-            <a:r>
-              <a:rPr lang="en-US" dirty="0" smtClean="0"/>
-              <a:t>Android</a:t>
-            </a:r>
-          </a:p>
-          <a:p>
-            <a:endParaRPr lang="en-US" dirty="0"/>
-          </a:p>
-        </p:txBody>
-      </p:sp>
-      <p:sp>
-        <p:nvSpPr>
-          <p:cNvPr id="2" name="Title 1"/>
-          <p:cNvSpPr>
-            <a:spLocks noGrp="1"/>
-          </p:cNvSpPr>
-          <p:nvPr>
-            <p:ph type="title"/>
-          </p:nvPr>
-        </p:nvSpPr>
-        <p:spPr/>
-        <p:txBody>
-          <a:bodyPr/>
-          <a:lstStyle/>
-          <a:p>
-            <a:r>
-              <a:rPr lang="en-US" dirty="0" smtClean="0"/>
-              <a:t>Next?</a:t>
+              <a:t>Lessons Learned</a:t>
             </a:r>
             <a:endParaRPr lang="en-US" dirty="0"/>
           </a:p>
@@ -4124,7 +4189,7 @@
     </p:spTree>
     <p:extLst>
       <p:ext uri="{BB962C8B-B14F-4D97-AF65-F5344CB8AC3E}">
-        <p14:creationId xmlns:p14="http://schemas.microsoft.com/office/powerpoint/2010/main" xmlns="" val="1607358168"/>
+        <p14:creationId xmlns="" xmlns:p14="http://schemas.microsoft.com/office/powerpoint/2010/main" val="1622542430"/>
       </p:ext>
     </p:extLst>
   </p:cSld>
@@ -4175,8 +4240,33 @@
           <a:p>
             <a:r>
               <a:rPr lang="en-US" dirty="0" smtClean="0"/>
-              <a:t>All done by us. </a:t>
-            </a:r>
+              <a:t>More </a:t>
+            </a:r>
+            <a:r>
+              <a:rPr lang="en-US" dirty="0" smtClean="0"/>
+              <a:t>Maps</a:t>
+            </a:r>
+          </a:p>
+          <a:p>
+            <a:r>
+              <a:rPr lang="en-US" dirty="0" smtClean="0"/>
+              <a:t>Bigger blocks</a:t>
+            </a:r>
+            <a:endParaRPr lang="en-US" dirty="0" smtClean="0"/>
+          </a:p>
+          <a:p>
+            <a:r>
+              <a:rPr lang="en-US" dirty="0" smtClean="0"/>
+              <a:t>More blocks </a:t>
+            </a:r>
+          </a:p>
+          <a:p>
+            <a:r>
+              <a:rPr lang="en-US" dirty="0" smtClean="0"/>
+              <a:t>Android</a:t>
+            </a:r>
+          </a:p>
+          <a:p>
             <a:endParaRPr lang="en-US" dirty="0"/>
           </a:p>
         </p:txBody>
@@ -4198,7 +4288,7 @@
           <a:p>
             <a:r>
               <a:rPr lang="en-US" dirty="0" smtClean="0"/>
-              <a:t>Resources</a:t>
+              <a:t>Next?</a:t>
             </a:r>
             <a:endParaRPr lang="en-US" dirty="0"/>
           </a:p>
@@ -4207,7 +4297,90 @@
     </p:spTree>
     <p:extLst>
       <p:ext uri="{BB962C8B-B14F-4D97-AF65-F5344CB8AC3E}">
-        <p14:creationId xmlns:p14="http://schemas.microsoft.com/office/powerpoint/2010/main" xmlns="" val="2538391610"/>
+        <p14:creationId xmlns="" xmlns:p14="http://schemas.microsoft.com/office/powerpoint/2010/main" val="1607358168"/>
+      </p:ext>
+    </p:extLst>
+  </p:cSld>
+  <p:clrMapOvr>
+    <a:masterClrMapping/>
+  </p:clrMapOvr>
+  <p:timing>
+    <p:tnLst>
+      <p:par>
+        <p:cTn id="1" dur="indefinite" restart="never" nodeType="tmRoot"/>
+      </p:par>
+    </p:tnLst>
+  </p:timing>
+</p:sld>
+</file>
+
+<file path=ppt/slides/slide9.xml><?xml version="1.0" encoding="utf-8"?>
+<p:sld xmlns:a="http://schemas.openxmlformats.org/drawingml/2006/main" xmlns:r="http://schemas.openxmlformats.org/officeDocument/2006/relationships" xmlns:p="http://schemas.openxmlformats.org/presentationml/2006/main">
+  <p:cSld>
+    <p:spTree>
+      <p:nvGrpSpPr>
+        <p:cNvPr id="1" name=""/>
+        <p:cNvGrpSpPr/>
+        <p:nvPr/>
+      </p:nvGrpSpPr>
+      <p:grpSpPr>
+        <a:xfrm>
+          <a:off x="0" y="0"/>
+          <a:ext cx="0" cy="0"/>
+          <a:chOff x="0" y="0"/>
+          <a:chExt cx="0" cy="0"/>
+        </a:xfrm>
+      </p:grpSpPr>
+      <p:sp>
+        <p:nvSpPr>
+          <p:cNvPr id="3" name="Content Placeholder 2"/>
+          <p:cNvSpPr>
+            <a:spLocks noGrp="1"/>
+          </p:cNvSpPr>
+          <p:nvPr>
+            <p:ph idx="1"/>
+          </p:nvPr>
+        </p:nvSpPr>
+        <p:spPr/>
+        <p:txBody>
+          <a:bodyPr/>
+          <a:lstStyle/>
+          <a:p>
+            <a:r>
+              <a:rPr lang="en-US" dirty="0" smtClean="0"/>
+              <a:t>All done by us. </a:t>
+            </a:r>
+            <a:endParaRPr lang="en-US" dirty="0"/>
+          </a:p>
+        </p:txBody>
+      </p:sp>
+      <p:sp>
+        <p:nvSpPr>
+          <p:cNvPr id="2" name="Title 1"/>
+          <p:cNvSpPr>
+            <a:spLocks noGrp="1"/>
+          </p:cNvSpPr>
+          <p:nvPr>
+            <p:ph type="title"/>
+          </p:nvPr>
+        </p:nvSpPr>
+        <p:spPr/>
+        <p:txBody>
+          <a:bodyPr/>
+          <a:lstStyle/>
+          <a:p>
+            <a:r>
+              <a:rPr lang="en-US" dirty="0" smtClean="0"/>
+              <a:t>Resources</a:t>
+            </a:r>
+            <a:endParaRPr lang="en-US" dirty="0"/>
+          </a:p>
+        </p:txBody>
+      </p:sp>
+    </p:spTree>
+    <p:extLst>
+      <p:ext uri="{BB962C8B-B14F-4D97-AF65-F5344CB8AC3E}">
+        <p14:creationId xmlns="" xmlns:p14="http://schemas.microsoft.com/office/powerpoint/2010/main" val="2538391610"/>
       </p:ext>
     </p:extLst>
   </p:cSld>

</xml_diff>